<commit_message>
added some more legit info to the PPT
</commit_message>
<xml_diff>
--- a/Hack-a-Thon Presentation.pptx
+++ b/Hack-a-Thon Presentation.pptx
@@ -347,7 +347,7 @@
           <a:p>
             <a:fld id="{84B8C708-5D84-4627-85B8-91F380789222}" type="datetimeFigureOut">
               <a:rPr lang="en-US" smtClean="0"/>
-              <a:t>5/5/2013</a:t>
+              <a:t>5/5/13</a:t>
             </a:fld>
             <a:endParaRPr lang="en-US"/>
           </a:p>
@@ -517,7 +517,7 @@
           <a:p>
             <a:fld id="{84B8C708-5D84-4627-85B8-91F380789222}" type="datetimeFigureOut">
               <a:rPr lang="en-US" smtClean="0"/>
-              <a:t>5/5/2013</a:t>
+              <a:t>5/5/13</a:t>
             </a:fld>
             <a:endParaRPr lang="en-US"/>
           </a:p>
@@ -692,7 +692,7 @@
           <a:p>
             <a:fld id="{84B8C708-5D84-4627-85B8-91F380789222}" type="datetimeFigureOut">
               <a:rPr lang="en-US" smtClean="0"/>
-              <a:t>5/5/2013</a:t>
+              <a:t>5/5/13</a:t>
             </a:fld>
             <a:endParaRPr lang="en-US"/>
           </a:p>
@@ -857,7 +857,7 @@
           <a:p>
             <a:fld id="{84B8C708-5D84-4627-85B8-91F380789222}" type="datetimeFigureOut">
               <a:rPr lang="en-US" smtClean="0"/>
-              <a:t>5/5/2013</a:t>
+              <a:t>5/5/13</a:t>
             </a:fld>
             <a:endParaRPr lang="en-US"/>
           </a:p>
@@ -1114,7 +1114,7 @@
           <a:p>
             <a:fld id="{84B8C708-5D84-4627-85B8-91F380789222}" type="datetimeFigureOut">
               <a:rPr lang="en-US" smtClean="0"/>
-              <a:t>5/5/2013</a:t>
+              <a:t>5/5/13</a:t>
             </a:fld>
             <a:endParaRPr lang="en-US"/>
           </a:p>
@@ -1254,7 +1254,7 @@
           <a:p>
             <a:fld id="{84B8C708-5D84-4627-85B8-91F380789222}" type="datetimeFigureOut">
               <a:rPr lang="en-US" smtClean="0"/>
-              <a:t>5/5/2013</a:t>
+              <a:t>5/5/13</a:t>
             </a:fld>
             <a:endParaRPr lang="en-US"/>
           </a:p>
@@ -1904,7 +1904,7 @@
           <a:p>
             <a:fld id="{84B8C708-5D84-4627-85B8-91F380789222}" type="datetimeFigureOut">
               <a:rPr lang="en-US" smtClean="0"/>
-              <a:t>5/5/2013</a:t>
+              <a:t>5/5/13</a:t>
             </a:fld>
             <a:endParaRPr lang="en-US"/>
           </a:p>
@@ -2017,7 +2017,7 @@
           <a:p>
             <a:fld id="{84B8C708-5D84-4627-85B8-91F380789222}" type="datetimeFigureOut">
               <a:rPr lang="en-US" smtClean="0"/>
-              <a:t>5/5/2013</a:t>
+              <a:t>5/5/13</a:t>
             </a:fld>
             <a:endParaRPr lang="en-US"/>
           </a:p>
@@ -2107,7 +2107,7 @@
           <a:p>
             <a:fld id="{84B8C708-5D84-4627-85B8-91F380789222}" type="datetimeFigureOut">
               <a:rPr lang="en-US" smtClean="0"/>
-              <a:t>5/5/2013</a:t>
+              <a:t>5/5/13</a:t>
             </a:fld>
             <a:endParaRPr lang="en-US"/>
           </a:p>
@@ -2397,7 +2397,7 @@
           <a:p>
             <a:fld id="{84B8C708-5D84-4627-85B8-91F380789222}" type="datetimeFigureOut">
               <a:rPr lang="en-US" smtClean="0"/>
-              <a:t>5/5/2013</a:t>
+              <a:t>5/5/13</a:t>
             </a:fld>
             <a:endParaRPr lang="en-US"/>
           </a:p>
@@ -2720,7 +2720,7 @@
           <a:p>
             <a:fld id="{84B8C708-5D84-4627-85B8-91F380789222}" type="datetimeFigureOut">
               <a:rPr lang="en-US" smtClean="0"/>
-              <a:t>5/5/2013</a:t>
+              <a:t>5/5/13</a:t>
             </a:fld>
             <a:endParaRPr lang="en-US"/>
           </a:p>
@@ -3206,7 +3206,7 @@
           <a:p>
             <a:fld id="{84B8C708-5D84-4627-85B8-91F380789222}" type="datetimeFigureOut">
               <a:rPr lang="en-US" smtClean="0"/>
-              <a:t>5/5/2013</a:t>
+              <a:t>5/5/13</a:t>
             </a:fld>
             <a:endParaRPr lang="en-US"/>
           </a:p>
@@ -3795,7 +3795,7 @@
   <p:timing>
     <p:tnLst>
       <p:par>
-        <p:cTn id="1" dur="indefinite" restart="never" nodeType="tmRoot"/>
+        <p:cTn xmlns:p14="http://schemas.microsoft.com/office/powerpoint/2010/main" id="1" dur="indefinite" restart="never" nodeType="tmRoot"/>
       </p:par>
     </p:tnLst>
   </p:timing>
@@ -3845,8 +3845,8 @@
               <a:t>It’s written in </a:t>
             </a:r>
             <a:r>
-              <a:rPr lang="en-US" dirty="0" err="1" smtClean="0"/>
-              <a:t>php</a:t>
+              <a:rPr lang="en-US" dirty="0" smtClean="0"/>
+              <a:t>PHP</a:t>
             </a:r>
             <a:endParaRPr lang="en-US" dirty="0" smtClean="0"/>
           </a:p>
@@ -3893,7 +3893,7 @@
   <p:timing>
     <p:tnLst>
       <p:par>
-        <p:cTn id="1" dur="indefinite" restart="never" nodeType="tmRoot"/>
+        <p:cTn xmlns:p14="http://schemas.microsoft.com/office/powerpoint/2010/main" id="1" dur="indefinite" restart="never" nodeType="tmRoot"/>
       </p:par>
     </p:tnLst>
   </p:timing>
@@ -3951,11 +3951,7 @@
           <a:p>
             <a:r>
               <a:rPr lang="en-US" dirty="0" smtClean="0"/>
-              <a:t>Don’t worry about paying for the infrastructure, that stuff is free anyway, right</a:t>
-            </a:r>
-            <a:r>
-              <a:rPr lang="en-US" dirty="0" smtClean="0"/>
-              <a:t>?</a:t>
+              <a:t>Don’t worry about paying for the infrastructure, that stuff is free anyway, right?</a:t>
             </a:r>
           </a:p>
           <a:p>
@@ -4008,7 +4004,7 @@
   <p:timing>
     <p:tnLst>
       <p:par>
-        <p:cTn id="1" dur="indefinite" restart="never" nodeType="tmRoot"/>
+        <p:cTn xmlns:p14="http://schemas.microsoft.com/office/powerpoint/2010/main" id="1" dur="indefinite" restart="never" nodeType="tmRoot"/>
       </p:par>
     </p:tnLst>
   </p:timing>
@@ -4049,7 +4045,25 @@
           <a:p>
             <a:r>
               <a:rPr lang="en-US" dirty="0" smtClean="0"/>
-              <a:t>What GUI</a:t>
+              <a:t>What GUI?</a:t>
+            </a:r>
+          </a:p>
+          <a:p>
+            <a:r>
+              <a:rPr lang="en-US" dirty="0" smtClean="0"/>
+              <a:t>What do you mean this </a:t>
+            </a:r>
+            <a:r>
+              <a:rPr lang="en-US" dirty="0" smtClean="0"/>
+              <a:t>P</a:t>
+            </a:r>
+            <a:r>
+              <a:rPr lang="en-US" dirty="0" smtClean="0"/>
+              <a:t>owerPoint </a:t>
+            </a:r>
+            <a:r>
+              <a:rPr lang="en-US" dirty="0" smtClean="0"/>
+              <a:t>doesn’t count as a GUI</a:t>
             </a:r>
             <a:r>
               <a:rPr lang="en-US" dirty="0" smtClean="0"/>
@@ -4059,19 +4073,27 @@
           <a:p>
             <a:r>
               <a:rPr lang="en-US" dirty="0" smtClean="0"/>
-              <a:t>What do you mean this </a:t>
+              <a:t>Originally investigated a PHP shell for the Google </a:t>
+            </a:r>
+            <a:r>
+              <a:rPr lang="en-US" dirty="0" smtClean="0"/>
+              <a:t>Chart</a:t>
+            </a:r>
+            <a:r>
+              <a:rPr lang="en-US" dirty="0" smtClean="0"/>
+              <a:t>s API called </a:t>
             </a:r>
             <a:r>
               <a:rPr lang="en-US" dirty="0" err="1" smtClean="0"/>
-              <a:t>powerpoint</a:t>
-            </a:r>
+              <a:t>gChartPHP</a:t>
+            </a:r>
+            <a:endParaRPr lang="en-US" dirty="0" smtClean="0"/>
+          </a:p>
+          <a:p>
+            <a:pPr lvl="1"/>
             <a:r>
               <a:rPr lang="en-US" dirty="0" smtClean="0"/>
-              <a:t> doesn’t count </a:t>
-            </a:r>
-            <a:r>
-              <a:rPr lang="en-US" smtClean="0"/>
-              <a:t>as a GUI?</a:t>
+              <a:t>Worked for a while (meaning, things showed up on the screen) but then it didn’t</a:t>
             </a:r>
             <a:endParaRPr lang="en-US" dirty="0"/>
           </a:p>
@@ -4118,7 +4140,7 @@
   <p:timing>
     <p:tnLst>
       <p:par>
-        <p:cTn id="1" dur="indefinite" restart="never" nodeType="tmRoot"/>
+        <p:cTn xmlns:p14="http://schemas.microsoft.com/office/powerpoint/2010/main" id="1" dur="indefinite" restart="never" nodeType="tmRoot"/>
       </p:par>
     </p:tnLst>
   </p:timing>

</xml_diff>

<commit_message>
lol i hope this works (added algorithm stuff)
</commit_message>
<xml_diff>
--- a/Hack-a-Thon Presentation.pptx
+++ b/Hack-a-Thon Presentation.pptx
@@ -347,7 +347,7 @@
           <a:p>
             <a:fld id="{84B8C708-5D84-4627-85B8-91F380789222}" type="datetimeFigureOut">
               <a:rPr lang="en-US" smtClean="0"/>
-              <a:t>5/5/13</a:t>
+              <a:t>5/5/2013</a:t>
             </a:fld>
             <a:endParaRPr lang="en-US"/>
           </a:p>
@@ -517,7 +517,7 @@
           <a:p>
             <a:fld id="{84B8C708-5D84-4627-85B8-91F380789222}" type="datetimeFigureOut">
               <a:rPr lang="en-US" smtClean="0"/>
-              <a:t>5/5/13</a:t>
+              <a:t>5/5/2013</a:t>
             </a:fld>
             <a:endParaRPr lang="en-US"/>
           </a:p>
@@ -692,7 +692,7 @@
           <a:p>
             <a:fld id="{84B8C708-5D84-4627-85B8-91F380789222}" type="datetimeFigureOut">
               <a:rPr lang="en-US" smtClean="0"/>
-              <a:t>5/5/13</a:t>
+              <a:t>5/5/2013</a:t>
             </a:fld>
             <a:endParaRPr lang="en-US"/>
           </a:p>
@@ -857,7 +857,7 @@
           <a:p>
             <a:fld id="{84B8C708-5D84-4627-85B8-91F380789222}" type="datetimeFigureOut">
               <a:rPr lang="en-US" smtClean="0"/>
-              <a:t>5/5/13</a:t>
+              <a:t>5/5/2013</a:t>
             </a:fld>
             <a:endParaRPr lang="en-US"/>
           </a:p>
@@ -1114,7 +1114,7 @@
           <a:p>
             <a:fld id="{84B8C708-5D84-4627-85B8-91F380789222}" type="datetimeFigureOut">
               <a:rPr lang="en-US" smtClean="0"/>
-              <a:t>5/5/13</a:t>
+              <a:t>5/5/2013</a:t>
             </a:fld>
             <a:endParaRPr lang="en-US"/>
           </a:p>
@@ -1254,7 +1254,7 @@
           <a:p>
             <a:fld id="{84B8C708-5D84-4627-85B8-91F380789222}" type="datetimeFigureOut">
               <a:rPr lang="en-US" smtClean="0"/>
-              <a:t>5/5/13</a:t>
+              <a:t>5/5/2013</a:t>
             </a:fld>
             <a:endParaRPr lang="en-US"/>
           </a:p>
@@ -1904,7 +1904,7 @@
           <a:p>
             <a:fld id="{84B8C708-5D84-4627-85B8-91F380789222}" type="datetimeFigureOut">
               <a:rPr lang="en-US" smtClean="0"/>
-              <a:t>5/5/13</a:t>
+              <a:t>5/5/2013</a:t>
             </a:fld>
             <a:endParaRPr lang="en-US"/>
           </a:p>
@@ -2017,7 +2017,7 @@
           <a:p>
             <a:fld id="{84B8C708-5D84-4627-85B8-91F380789222}" type="datetimeFigureOut">
               <a:rPr lang="en-US" smtClean="0"/>
-              <a:t>5/5/13</a:t>
+              <a:t>5/5/2013</a:t>
             </a:fld>
             <a:endParaRPr lang="en-US"/>
           </a:p>
@@ -2107,7 +2107,7 @@
           <a:p>
             <a:fld id="{84B8C708-5D84-4627-85B8-91F380789222}" type="datetimeFigureOut">
               <a:rPr lang="en-US" smtClean="0"/>
-              <a:t>5/5/13</a:t>
+              <a:t>5/5/2013</a:t>
             </a:fld>
             <a:endParaRPr lang="en-US"/>
           </a:p>
@@ -2397,7 +2397,7 @@
           <a:p>
             <a:fld id="{84B8C708-5D84-4627-85B8-91F380789222}" type="datetimeFigureOut">
               <a:rPr lang="en-US" smtClean="0"/>
-              <a:t>5/5/13</a:t>
+              <a:t>5/5/2013</a:t>
             </a:fld>
             <a:endParaRPr lang="en-US"/>
           </a:p>
@@ -2720,7 +2720,7 @@
           <a:p>
             <a:fld id="{84B8C708-5D84-4627-85B8-91F380789222}" type="datetimeFigureOut">
               <a:rPr lang="en-US" smtClean="0"/>
-              <a:t>5/5/13</a:t>
+              <a:t>5/5/2013</a:t>
             </a:fld>
             <a:endParaRPr lang="en-US"/>
           </a:p>
@@ -3206,7 +3206,7 @@
           <a:p>
             <a:fld id="{84B8C708-5D84-4627-85B8-91F380789222}" type="datetimeFigureOut">
               <a:rPr lang="en-US" smtClean="0"/>
-              <a:t>5/5/13</a:t>
+              <a:t>5/5/2013</a:t>
             </a:fld>
             <a:endParaRPr lang="en-US"/>
           </a:p>
@@ -3795,7 +3795,7 @@
   <p:timing>
     <p:tnLst>
       <p:par>
-        <p:cTn xmlns:p14="http://schemas.microsoft.com/office/powerpoint/2010/main" id="1" dur="indefinite" restart="never" nodeType="tmRoot"/>
+        <p:cTn id="1" dur="indefinite" restart="never" nodeType="tmRoot"/>
       </p:par>
     </p:tnLst>
   </p:timing>
@@ -3845,8 +3845,8 @@
               <a:t>It’s written in </a:t>
             </a:r>
             <a:r>
-              <a:rPr lang="en-US" dirty="0" smtClean="0"/>
-              <a:t>PHP</a:t>
+              <a:rPr lang="en-US" dirty="0" err="1" smtClean="0"/>
+              <a:t>php</a:t>
             </a:r>
             <a:endParaRPr lang="en-US" dirty="0" smtClean="0"/>
           </a:p>
@@ -3893,7 +3893,7 @@
   <p:timing>
     <p:tnLst>
       <p:par>
-        <p:cTn xmlns:p14="http://schemas.microsoft.com/office/powerpoint/2010/main" id="1" dur="indefinite" restart="never" nodeType="tmRoot"/>
+        <p:cTn id="1" dur="indefinite" restart="never" nodeType="tmRoot"/>
       </p:par>
     </p:tnLst>
   </p:timing>
@@ -3951,7 +3951,11 @@
           <a:p>
             <a:r>
               <a:rPr lang="en-US" dirty="0" smtClean="0"/>
-              <a:t>Don’t worry about paying for the infrastructure, that stuff is free anyway, right?</a:t>
+              <a:t>Don’t worry about paying for the infrastructure, that stuff is free anyway, right</a:t>
+            </a:r>
+            <a:r>
+              <a:rPr lang="en-US" dirty="0" smtClean="0"/>
+              <a:t>?</a:t>
             </a:r>
           </a:p>
           <a:p>
@@ -4004,7 +4008,7 @@
   <p:timing>
     <p:tnLst>
       <p:par>
-        <p:cTn xmlns:p14="http://schemas.microsoft.com/office/powerpoint/2010/main" id="1" dur="indefinite" restart="never" nodeType="tmRoot"/>
+        <p:cTn id="1" dur="indefinite" restart="never" nodeType="tmRoot"/>
       </p:par>
     </p:tnLst>
   </p:timing>
@@ -4045,7 +4049,11 @@
           <a:p>
             <a:r>
               <a:rPr lang="en-US" dirty="0" smtClean="0"/>
-              <a:t>What GUI?</a:t>
+              <a:t>What GUI</a:t>
+            </a:r>
+            <a:r>
+              <a:rPr lang="en-US" dirty="0" smtClean="0"/>
+              <a:t>?</a:t>
             </a:r>
           </a:p>
           <a:p>
@@ -4054,46 +4062,16 @@
               <a:t>What do you mean this </a:t>
             </a:r>
             <a:r>
+              <a:rPr lang="en-US" dirty="0" err="1" smtClean="0"/>
+              <a:t>powerpoint</a:t>
+            </a:r>
+            <a:r>
               <a:rPr lang="en-US" dirty="0" smtClean="0"/>
-              <a:t>P</a:t>
-            </a:r>
-            <a:r>
-              <a:rPr lang="en-US" dirty="0" smtClean="0"/>
-              <a:t>owerPoint </a:t>
-            </a:r>
-            <a:r>
-              <a:rPr lang="en-US" dirty="0" smtClean="0"/>
-              <a:t>doesn’t count as a GUI</a:t>
-            </a:r>
-            <a:r>
-              <a:rPr lang="en-US" dirty="0" smtClean="0"/>
-              <a:t>?</a:t>
-            </a:r>
-          </a:p>
-          <a:p>
-            <a:r>
-              <a:rPr lang="en-US" dirty="0" smtClean="0"/>
-              <a:t>Originally investigated a PHP shell for the Google </a:t>
-            </a:r>
-            <a:r>
-              <a:rPr lang="en-US" dirty="0" smtClean="0"/>
-              <a:t>Chart</a:t>
-            </a:r>
-            <a:r>
-              <a:rPr lang="en-US" dirty="0" smtClean="0"/>
-              <a:t>s API called </a:t>
-            </a:r>
-            <a:r>
-              <a:rPr lang="en-US" dirty="0" err="1" smtClean="0"/>
-              <a:t>gChartPHP</a:t>
-            </a:r>
-            <a:endParaRPr lang="en-US" dirty="0" smtClean="0"/>
-          </a:p>
-          <a:p>
-            <a:pPr lvl="1"/>
-            <a:r>
-              <a:rPr lang="en-US" dirty="0" smtClean="0"/>
-              <a:t>Worked for a while (meaning, things showed up on the screen) but then it didn’t</a:t>
+              <a:t> doesn’t count </a:t>
+            </a:r>
+            <a:r>
+              <a:rPr lang="en-US" smtClean="0"/>
+              <a:t>as a GUI?</a:t>
             </a:r>
             <a:endParaRPr lang="en-US" dirty="0"/>
           </a:p>
@@ -4140,7 +4118,7 @@
   <p:timing>
     <p:tnLst>
       <p:par>
-        <p:cTn xmlns:p14="http://schemas.microsoft.com/office/powerpoint/2010/main" id="1" dur="indefinite" restart="never" nodeType="tmRoot"/>
+        <p:cTn id="1" dur="indefinite" restart="never" nodeType="tmRoot"/>
       </p:par>
     </p:tnLst>
   </p:timing>

</xml_diff>